<commit_message>
Added the correct final version of the fluid assignment presentation.
</commit_message>
<xml_diff>
--- a/RTP - Fluid Assignment (Presentation).pptx
+++ b/RTP - Fluid Assignment (Presentation).pptx
@@ -125,7 +125,7 @@
   </p:defaultTextStyle>
   <p:extLst>
     <p:ext uri="{EFAFB233-063F-42B5-8137-9DF3F51BA10A}">
-      <p15:sldGuideLst xmlns:p15="http://schemas.microsoft.com/office/powerpoint/2012/main">
+      <p15:sldGuideLst xmlns:p15="http://schemas.microsoft.com/office/powerpoint/2012/main" xmlns="">
         <p15:guide id="1" orient="horz" pos="147">
           <p15:clr>
             <a:srgbClr val="A4A3A4"/>
@@ -274,7 +274,7 @@
       </p15:sldGuideLst>
     </p:ext>
     <p:ext uri="{2D200454-40CA-4A62-9FC3-DE9A4176ACB9}">
-      <p15:notesGuideLst xmlns:p15="http://schemas.microsoft.com/office/powerpoint/2012/main">
+      <p15:notesGuideLst xmlns:p15="http://schemas.microsoft.com/office/powerpoint/2012/main" xmlns="">
         <p15:guide id="1" orient="horz" pos="2880">
           <p15:clr>
             <a:srgbClr val="A4A3A4"/>
@@ -1052,7 +1052,7 @@
             <a:fld id="{81331B57-0BE5-4F82-AA58-76F53EFF3ADA}" type="datetime8">
               <a:rPr lang="en-US" smtClean="0"/>
               <a:pPr/>
-              <a:t>3/31/2014 12:50 AM</a:t>
+              <a:t>3/31/2014 1:32 PM</a:t>
             </a:fld>
             <a:endParaRPr lang="en-US"/>
           </a:p>
@@ -5960,9 +5960,21 @@
           <a:p>
             <a:r>
               <a:rPr lang="en-US" dirty="0" smtClean="0"/>
-              <a:t>My Approach</a:t>
-            </a:r>
-            <a:endParaRPr lang="en-US" dirty="0"/>
+              <a:t>My </a:t>
+            </a:r>
+            <a:r>
+              <a:rPr lang="en-US" dirty="0" smtClean="0">
+                <a:solidFill>
+                  <a:srgbClr val="0070C0"/>
+                </a:solidFill>
+              </a:rPr>
+              <a:t>Approach</a:t>
+            </a:r>
+            <a:endParaRPr lang="en-US" dirty="0">
+              <a:solidFill>
+                <a:srgbClr val="0070C0"/>
+              </a:solidFill>
+            </a:endParaRPr>
           </a:p>
         </p:txBody>
       </p:sp>
@@ -6854,7 +6866,15 @@
             <a:pPr lvl="1"/>
             <a:r>
               <a:rPr lang="en-IE" dirty="0" smtClean="0"/>
-              <a:t>Decided that Muller’s people was easier to visualise.</a:t>
+              <a:t>Decided that Muller’s </a:t>
+            </a:r>
+            <a:r>
+              <a:rPr lang="en-IE" dirty="0" smtClean="0"/>
+              <a:t>paper was </a:t>
+            </a:r>
+            <a:r>
+              <a:rPr lang="en-IE" dirty="0" smtClean="0"/>
+              <a:t>easier to visualise.</a:t>
             </a:r>
           </a:p>
           <a:p>
@@ -6868,7 +6888,23 @@
             <a:pPr lvl="1"/>
             <a:r>
               <a:rPr lang="en-IE" dirty="0" smtClean="0"/>
-              <a:t>Less concerned with their attempts to visualise surface particles.</a:t>
+              <a:t>Less concerned with </a:t>
+            </a:r>
+            <a:r>
+              <a:rPr lang="en-IE" dirty="0" smtClean="0"/>
+              <a:t>attempts </a:t>
+            </a:r>
+            <a:r>
+              <a:rPr lang="en-IE" dirty="0" smtClean="0"/>
+              <a:t>to </a:t>
+            </a:r>
+            <a:r>
+              <a:rPr lang="en-IE" dirty="0" smtClean="0"/>
+              <a:t>realistically visualise </a:t>
+            </a:r>
+            <a:r>
+              <a:rPr lang="en-IE" dirty="0" smtClean="0"/>
+              <a:t>surface particles.</a:t>
             </a:r>
           </a:p>
           <a:p>
@@ -7106,15 +7142,7 @@
             <a:pPr lvl="1"/>
             <a:r>
               <a:rPr lang="en-US" dirty="0" smtClean="0"/>
-              <a:t>SPH provides us with smoothed approximations of the quantity of fluid </a:t>
-            </a:r>
-            <a:r>
-              <a:rPr lang="en-US" dirty="0" smtClean="0"/>
-              <a:t>“in” </a:t>
-            </a:r>
-            <a:r>
-              <a:rPr lang="en-US" dirty="0" smtClean="0"/>
-              <a:t>each particle.</a:t>
+              <a:t>SPH provides us with smoothed approximations of the quantity of fluid “in” each particle.</a:t>
             </a:r>
           </a:p>
           <a:p>
@@ -7303,13 +7331,13 @@
   <p:clrMapOvr>
     <a:masterClrMapping/>
   </p:clrMapOvr>
-  <mc:AlternateContent xmlns:mc="http://schemas.openxmlformats.org/markup-compatibility/2006">
-    <mc:Choice xmlns:p14="http://schemas.microsoft.com/office/powerpoint/2010/main" Requires="p14">
+  <mc:AlternateContent xmlns:mc="http://schemas.openxmlformats.org/markup-compatibility/2006" xmlns:p14="http://schemas.microsoft.com/office/powerpoint/2010/main">
+    <mc:Choice Requires="p14">
       <p:transition spd="slow" p14:dur="1500">
         <p14:reveal/>
       </p:transition>
     </mc:Choice>
-    <mc:Fallback>
+    <mc:Fallback xmlns="">
       <p:transition spd="slow">
         <p:fade/>
       </p:transition>
@@ -7466,13 +7494,13 @@
   <p:clrMapOvr>
     <a:masterClrMapping/>
   </p:clrMapOvr>
-  <mc:AlternateContent xmlns:mc="http://schemas.openxmlformats.org/markup-compatibility/2006">
-    <mc:Choice xmlns:p14="http://schemas.microsoft.com/office/powerpoint/2010/main" Requires="p14">
+  <mc:AlternateContent xmlns:mc="http://schemas.openxmlformats.org/markup-compatibility/2006" xmlns:p14="http://schemas.microsoft.com/office/powerpoint/2010/main">
+    <mc:Choice Requires="p14">
       <p:transition spd="slow" p14:dur="1500">
         <p14:reveal/>
       </p:transition>
     </mc:Choice>
-    <mc:Fallback>
+    <mc:Fallback xmlns="">
       <p:transition spd="slow">
         <p:fade/>
       </p:transition>
@@ -7655,13 +7683,13 @@
   <p:clrMapOvr>
     <a:masterClrMapping/>
   </p:clrMapOvr>
-  <mc:AlternateContent xmlns:mc="http://schemas.openxmlformats.org/markup-compatibility/2006">
-    <mc:Choice xmlns:p14="http://schemas.microsoft.com/office/powerpoint/2010/main" Requires="p14">
+  <mc:AlternateContent xmlns:mc="http://schemas.openxmlformats.org/markup-compatibility/2006" xmlns:p14="http://schemas.microsoft.com/office/powerpoint/2010/main">
+    <mc:Choice Requires="p14">
       <p:transition spd="slow" p14:dur="1500">
         <p14:reveal/>
       </p:transition>
     </mc:Choice>
-    <mc:Fallback>
+    <mc:Fallback xmlns="">
       <p:transition spd="slow">
         <p:fade/>
       </p:transition>
@@ -7829,13 +7857,13 @@
   <p:clrMapOvr>
     <a:masterClrMapping/>
   </p:clrMapOvr>
-  <mc:AlternateContent xmlns:mc="http://schemas.openxmlformats.org/markup-compatibility/2006">
-    <mc:Choice xmlns:p14="http://schemas.microsoft.com/office/powerpoint/2010/main" Requires="p14">
+  <mc:AlternateContent xmlns:mc="http://schemas.openxmlformats.org/markup-compatibility/2006" xmlns:p14="http://schemas.microsoft.com/office/powerpoint/2010/main">
+    <mc:Choice Requires="p14">
       <p:transition spd="slow" p14:dur="1500">
         <p14:reveal/>
       </p:transition>
     </mc:Choice>
-    <mc:Fallback>
+    <mc:Fallback xmlns="">
       <p:transition spd="slow">
         <p:fade/>
       </p:transition>
@@ -8009,17 +8037,8 @@
             </a:pPr>
             <a:r>
               <a:rPr lang="en-US" dirty="0" smtClean="0"/>
-              <a:t>Main stumbling block - Fine tuning </a:t>
-            </a:r>
-            <a:r>
-              <a:rPr lang="en-US" dirty="0" smtClean="0"/>
-              <a:t>the fluid </a:t>
-            </a:r>
-            <a:r>
-              <a:rPr lang="en-US" dirty="0" smtClean="0"/>
-              <a:t>constants!</a:t>
-            </a:r>
-            <a:endParaRPr lang="en-US" dirty="0" smtClean="0"/>
+              <a:t>Main stumbling block - Fine tuning the fluid constants!</a:t>
+            </a:r>
           </a:p>
           <a:p>
             <a:pPr lvl="1"/>
@@ -8147,9 +8166,21 @@
           <a:p>
             <a:r>
               <a:rPr lang="en-US" dirty="0" smtClean="0"/>
-              <a:t>My Approach</a:t>
-            </a:r>
-            <a:endParaRPr lang="en-US" dirty="0"/>
+              <a:t>My </a:t>
+            </a:r>
+            <a:r>
+              <a:rPr lang="en-US" dirty="0" smtClean="0">
+                <a:solidFill>
+                  <a:srgbClr val="0070C0"/>
+                </a:solidFill>
+              </a:rPr>
+              <a:t>Approach</a:t>
+            </a:r>
+            <a:endParaRPr lang="en-US" dirty="0">
+              <a:solidFill>
+                <a:srgbClr val="0070C0"/>
+              </a:solidFill>
+            </a:endParaRPr>
           </a:p>
         </p:txBody>
       </p:sp>
@@ -9586,12 +9617,58 @@
 </file>
 
 <file path=customXml/item1.xml><?xml version="1.0" encoding="utf-8"?>
-<?mso-contentType ?>
-<FormTemplates xmlns="http://schemas.microsoft.com/sharepoint/v3/contenttype/forms">
-  <Display>DocumentLibraryForm</Display>
-  <Edit>DocumentLibraryForm</Edit>
-  <New>DocumentLibraryForm</New>
-</FormTemplates>
+<p:properties xmlns:p="http://schemas.microsoft.com/office/2006/metadata/properties" xmlns:xsi="http://www.w3.org/2001/XMLSchema-instance" xmlns:pc="http://schemas.microsoft.com/office/infopath/2007/PartnerControls">
+  <documentManagement>
+    <TrackTaxHTField0 xmlns="2295e2e7-0eeb-498e-8716-217bb2ee6ee3">
+      <Terms xmlns="http://schemas.microsoft.com/office/infopath/2007/PartnerControls"/>
+    </TrackTaxHTField0>
+    <CampaignTaxHTField0 xmlns="2295e2e7-0eeb-498e-8716-217bb2ee6ee3">
+      <Terms xmlns="http://schemas.microsoft.com/office/infopath/2007/PartnerControls"/>
+    </CampaignTaxHTField0>
+    <Event_x0020_End_x0020_Date xmlns="2295e2e7-0eeb-498e-8716-217bb2ee6ee3" xsi:nil="true"/>
+    <Event_x0020_Start_x0020_Date xmlns="2295e2e7-0eeb-498e-8716-217bb2ee6ee3" xsi:nil="true"/>
+    <MS_x0020_Speaker xmlns="2295e2e7-0eeb-498e-8716-217bb2ee6ee3">
+      <UserInfo>
+        <DisplayName/>
+        <AccountId xsi:nil="true"/>
+        <AccountType/>
+      </UserInfo>
+    </MS_x0020_Speaker>
+    <External_x0020_Speaker xmlns="2295e2e7-0eeb-498e-8716-217bb2ee6ee3" xsi:nil="true"/>
+    <Session_x0020_Code xmlns="2295e2e7-0eeb-498e-8716-217bb2ee6ee3" xsi:nil="true"/>
+    <ProductTaxHTField0 xmlns="2295e2e7-0eeb-498e-8716-217bb2ee6ee3">
+      <Terms xmlns="http://schemas.microsoft.com/office/infopath/2007/PartnerControls"/>
+    </ProductTaxHTField0>
+    <Presentation_x0020_Date xmlns="2295e2e7-0eeb-498e-8716-217bb2ee6ee3" xsi:nil="true"/>
+    <Event_x0020_LocationTaxHTField0 xmlns="2295e2e7-0eeb-498e-8716-217bb2ee6ee3">
+      <Terms xmlns="http://schemas.microsoft.com/office/infopath/2007/PartnerControls"/>
+    </Event_x0020_LocationTaxHTField0>
+    <Event1TaxHTField0 xmlns="2295e2e7-0eeb-498e-8716-217bb2ee6ee3">
+      <Terms xmlns="http://schemas.microsoft.com/office/infopath/2007/PartnerControls">
+        <TermInfo xmlns="http://schemas.microsoft.com/office/infopath/2007/PartnerControls">
+          <TermName xmlns="http://schemas.microsoft.com/office/infopath/2007/PartnerControls">Unassigned</TermName>
+          <TermId xmlns="http://schemas.microsoft.com/office/infopath/2007/PartnerControls">e51362f4-782c-41a8-bb7b-e0cfc8669933</TermId>
+        </TermInfo>
+      </Terms>
+    </Event1TaxHTField0>
+    <MS_x0020_Content_x0020_Owner xmlns="2295e2e7-0eeb-498e-8716-217bb2ee6ee3">
+      <UserInfo>
+        <DisplayName/>
+        <AccountId xsi:nil="true"/>
+        <AccountType/>
+      </UserInfo>
+    </MS_x0020_Content_x0020_Owner>
+    <TaxCatchAll xmlns="2295e2e7-0eeb-498e-8716-217bb2ee6ee3">
+      <Value>217</Value>
+    </TaxCatchAll>
+    <Event_x0020_VenueTaxHTField0 xmlns="2295e2e7-0eeb-498e-8716-217bb2ee6ee3">
+      <Terms xmlns="http://schemas.microsoft.com/office/infopath/2007/PartnerControls"/>
+    </Event_x0020_VenueTaxHTField0>
+    <AudienceTaxHTField0 xmlns="c6bb9d19-7926-47a4-9d93-93d54014735c">
+      <Terms xmlns="http://schemas.microsoft.com/office/infopath/2007/PartnerControls"/>
+    </AudienceTaxHTField0>
+  </documentManagement>
+</p:properties>
 </file>
 
 <file path=customXml/item2.xml><?xml version="1.0" encoding="utf-8"?>
@@ -9891,64 +9968,28 @@
 </file>
 
 <file path=customXml/item3.xml><?xml version="1.0" encoding="utf-8"?>
-<p:properties xmlns:p="http://schemas.microsoft.com/office/2006/metadata/properties" xmlns:xsi="http://www.w3.org/2001/XMLSchema-instance" xmlns:pc="http://schemas.microsoft.com/office/infopath/2007/PartnerControls">
-  <documentManagement>
-    <TrackTaxHTField0 xmlns="2295e2e7-0eeb-498e-8716-217bb2ee6ee3">
-      <Terms xmlns="http://schemas.microsoft.com/office/infopath/2007/PartnerControls"/>
-    </TrackTaxHTField0>
-    <CampaignTaxHTField0 xmlns="2295e2e7-0eeb-498e-8716-217bb2ee6ee3">
-      <Terms xmlns="http://schemas.microsoft.com/office/infopath/2007/PartnerControls"/>
-    </CampaignTaxHTField0>
-    <Event_x0020_End_x0020_Date xmlns="2295e2e7-0eeb-498e-8716-217bb2ee6ee3" xsi:nil="true"/>
-    <Event_x0020_Start_x0020_Date xmlns="2295e2e7-0eeb-498e-8716-217bb2ee6ee3" xsi:nil="true"/>
-    <MS_x0020_Speaker xmlns="2295e2e7-0eeb-498e-8716-217bb2ee6ee3">
-      <UserInfo>
-        <DisplayName/>
-        <AccountId xsi:nil="true"/>
-        <AccountType/>
-      </UserInfo>
-    </MS_x0020_Speaker>
-    <External_x0020_Speaker xmlns="2295e2e7-0eeb-498e-8716-217bb2ee6ee3" xsi:nil="true"/>
-    <Session_x0020_Code xmlns="2295e2e7-0eeb-498e-8716-217bb2ee6ee3" xsi:nil="true"/>
-    <ProductTaxHTField0 xmlns="2295e2e7-0eeb-498e-8716-217bb2ee6ee3">
-      <Terms xmlns="http://schemas.microsoft.com/office/infopath/2007/PartnerControls"/>
-    </ProductTaxHTField0>
-    <Presentation_x0020_Date xmlns="2295e2e7-0eeb-498e-8716-217bb2ee6ee3" xsi:nil="true"/>
-    <Event_x0020_LocationTaxHTField0 xmlns="2295e2e7-0eeb-498e-8716-217bb2ee6ee3">
-      <Terms xmlns="http://schemas.microsoft.com/office/infopath/2007/PartnerControls"/>
-    </Event_x0020_LocationTaxHTField0>
-    <Event1TaxHTField0 xmlns="2295e2e7-0eeb-498e-8716-217bb2ee6ee3">
-      <Terms xmlns="http://schemas.microsoft.com/office/infopath/2007/PartnerControls">
-        <TermInfo xmlns="http://schemas.microsoft.com/office/infopath/2007/PartnerControls">
-          <TermName xmlns="http://schemas.microsoft.com/office/infopath/2007/PartnerControls">Unassigned</TermName>
-          <TermId xmlns="http://schemas.microsoft.com/office/infopath/2007/PartnerControls">e51362f4-782c-41a8-bb7b-e0cfc8669933</TermId>
-        </TermInfo>
-      </Terms>
-    </Event1TaxHTField0>
-    <MS_x0020_Content_x0020_Owner xmlns="2295e2e7-0eeb-498e-8716-217bb2ee6ee3">
-      <UserInfo>
-        <DisplayName/>
-        <AccountId xsi:nil="true"/>
-        <AccountType/>
-      </UserInfo>
-    </MS_x0020_Content_x0020_Owner>
-    <TaxCatchAll xmlns="2295e2e7-0eeb-498e-8716-217bb2ee6ee3">
-      <Value>217</Value>
-    </TaxCatchAll>
-    <Event_x0020_VenueTaxHTField0 xmlns="2295e2e7-0eeb-498e-8716-217bb2ee6ee3">
-      <Terms xmlns="http://schemas.microsoft.com/office/infopath/2007/PartnerControls"/>
-    </Event_x0020_VenueTaxHTField0>
-    <AudienceTaxHTField0 xmlns="c6bb9d19-7926-47a4-9d93-93d54014735c">
-      <Terms xmlns="http://schemas.microsoft.com/office/infopath/2007/PartnerControls"/>
-    </AudienceTaxHTField0>
-  </documentManagement>
-</p:properties>
+<?mso-contentType ?>
+<FormTemplates xmlns="http://schemas.microsoft.com/sharepoint/v3/contenttype/forms">
+  <Display>DocumentLibraryForm</Display>
+  <Edit>DocumentLibraryForm</Edit>
+  <New>DocumentLibraryForm</New>
+</FormTemplates>
 </file>
 
 <file path=customXml/itemProps1.xml><?xml version="1.0" encoding="utf-8"?>
-<ds:datastoreItem xmlns:ds="http://schemas.openxmlformats.org/officeDocument/2006/customXml" ds:itemID="{758FDAC0-319D-4A54-8D8E-1D42CB1F8004}">
+<ds:datastoreItem xmlns:ds="http://schemas.openxmlformats.org/officeDocument/2006/customXml" ds:itemID="{F990F116-B58F-4255-B05B-DA3808E0E5C6}">
   <ds:schemaRefs>
-    <ds:schemaRef ds:uri="http://schemas.microsoft.com/sharepoint/v3/contenttype/forms"/>
+    <ds:schemaRef ds:uri="http://www.w3.org/XML/1998/namespace"/>
+    <ds:schemaRef ds:uri="http://purl.org/dc/elements/1.1/"/>
+    <ds:schemaRef ds:uri="http://schemas.microsoft.com/sharepoint/v3"/>
+    <ds:schemaRef ds:uri="http://schemas.microsoft.com/office/2006/documentManagement/types"/>
+    <ds:schemaRef ds:uri="http://schemas.openxmlformats.org/package/2006/metadata/core-properties"/>
+    <ds:schemaRef ds:uri="2295e2e7-0eeb-498e-8716-217bb2ee6ee3"/>
+    <ds:schemaRef ds:uri="http://schemas.microsoft.com/office/infopath/2007/PartnerControls"/>
+    <ds:schemaRef ds:uri="http://purl.org/dc/terms/"/>
+    <ds:schemaRef ds:uri="c6bb9d19-7926-47a4-9d93-93d54014735c"/>
+    <ds:schemaRef ds:uri="http://schemas.microsoft.com/office/2006/metadata/properties"/>
+    <ds:schemaRef ds:uri="http://purl.org/dc/dcmitype/"/>
   </ds:schemaRefs>
 </ds:datastoreItem>
 </file>
@@ -9974,19 +10015,9 @@
 </file>
 
 <file path=customXml/itemProps3.xml><?xml version="1.0" encoding="utf-8"?>
-<ds:datastoreItem xmlns:ds="http://schemas.openxmlformats.org/officeDocument/2006/customXml" ds:itemID="{F990F116-B58F-4255-B05B-DA3808E0E5C6}">
+<ds:datastoreItem xmlns:ds="http://schemas.openxmlformats.org/officeDocument/2006/customXml" ds:itemID="{758FDAC0-319D-4A54-8D8E-1D42CB1F8004}">
   <ds:schemaRefs>
-    <ds:schemaRef ds:uri="http://www.w3.org/XML/1998/namespace"/>
-    <ds:schemaRef ds:uri="http://purl.org/dc/elements/1.1/"/>
-    <ds:schemaRef ds:uri="http://schemas.microsoft.com/sharepoint/v3"/>
-    <ds:schemaRef ds:uri="http://schemas.microsoft.com/office/2006/documentManagement/types"/>
-    <ds:schemaRef ds:uri="http://schemas.openxmlformats.org/package/2006/metadata/core-properties"/>
-    <ds:schemaRef ds:uri="2295e2e7-0eeb-498e-8716-217bb2ee6ee3"/>
-    <ds:schemaRef ds:uri="http://schemas.microsoft.com/office/infopath/2007/PartnerControls"/>
-    <ds:schemaRef ds:uri="http://purl.org/dc/terms/"/>
-    <ds:schemaRef ds:uri="c6bb9d19-7926-47a4-9d93-93d54014735c"/>
-    <ds:schemaRef ds:uri="http://schemas.microsoft.com/office/2006/metadata/properties"/>
-    <ds:schemaRef ds:uri="http://purl.org/dc/dcmitype/"/>
+    <ds:schemaRef ds:uri="http://schemas.microsoft.com/sharepoint/v3/contenttype/forms"/>
   </ds:schemaRefs>
 </ds:datastoreItem>
 </file>
</xml_diff>